<commit_message>
added project specs and update to slides
</commit_message>
<xml_diff>
--- a/project-1-slides.pptx
+++ b/project-1-slides.pptx
@@ -8,14 +8,16 @@
     <p:sldId id="256" r:id="rId2"/>
     <p:sldId id="257" r:id="rId3"/>
     <p:sldId id="261" r:id="rId4"/>
-    <p:sldId id="264" r:id="rId5"/>
-    <p:sldId id="266" r:id="rId6"/>
-    <p:sldId id="265" r:id="rId7"/>
-    <p:sldId id="258" r:id="rId8"/>
-    <p:sldId id="259" r:id="rId9"/>
-    <p:sldId id="260" r:id="rId10"/>
-    <p:sldId id="262" r:id="rId11"/>
-    <p:sldId id="263" r:id="rId12"/>
+    <p:sldId id="265" r:id="rId5"/>
+    <p:sldId id="264" r:id="rId6"/>
+    <p:sldId id="266" r:id="rId7"/>
+    <p:sldId id="267" r:id="rId8"/>
+    <p:sldId id="268" r:id="rId9"/>
+    <p:sldId id="258" r:id="rId10"/>
+    <p:sldId id="259" r:id="rId11"/>
+    <p:sldId id="260" r:id="rId12"/>
+    <p:sldId id="262" r:id="rId13"/>
+    <p:sldId id="263" r:id="rId14"/>
   </p:sldIdLst>
   <p:sldSz cx="12192000" cy="6858000"/>
   <p:notesSz cx="6858000" cy="9144000"/>
@@ -3910,6 +3912,226 @@
           <p:cNvPr id="2" name="Title 1">
             <a:extLst>
               <a:ext uri="{FF2B5EF4-FFF2-40B4-BE49-F238E27FC236}">
+                <a16:creationId xmlns:a16="http://schemas.microsoft.com/office/drawing/2014/main" id="{0B6C9D4F-0F6E-EB9A-84DE-012E94343FC7}"/>
+              </a:ext>
+            </a:extLst>
+          </p:cNvPr>
+          <p:cNvSpPr>
+            <a:spLocks noGrp="1"/>
+          </p:cNvSpPr>
+          <p:nvPr>
+            <p:ph type="title"/>
+          </p:nvPr>
+        </p:nvSpPr>
+        <p:spPr/>
+        <p:txBody>
+          <a:bodyPr/>
+          <a:lstStyle/>
+          <a:p>
+            <a:r>
+              <a:rPr lang="en-CA" dirty="0"/>
+              <a:t>Limitations </a:t>
+            </a:r>
+          </a:p>
+        </p:txBody>
+      </p:sp>
+      <p:sp>
+        <p:nvSpPr>
+          <p:cNvPr id="3" name="Content Placeholder 2">
+            <a:extLst>
+              <a:ext uri="{FF2B5EF4-FFF2-40B4-BE49-F238E27FC236}">
+                <a16:creationId xmlns:a16="http://schemas.microsoft.com/office/drawing/2014/main" id="{347498B9-FD20-DC52-40FA-8DFAC8BF5F6F}"/>
+              </a:ext>
+            </a:extLst>
+          </p:cNvPr>
+          <p:cNvSpPr>
+            <a:spLocks noGrp="1"/>
+          </p:cNvSpPr>
+          <p:nvPr>
+            <p:ph idx="1"/>
+          </p:nvPr>
+        </p:nvSpPr>
+        <p:spPr/>
+        <p:txBody>
+          <a:bodyPr/>
+          <a:lstStyle/>
+          <a:p>
+            <a:r>
+              <a:rPr lang="en-CA" dirty="0"/>
+              <a:t>- Only attempted to solve subproblem</a:t>
+            </a:r>
+          </a:p>
+          <a:p>
+            <a:r>
+              <a:rPr lang="en-CA" dirty="0"/>
+              <a:t>- Poor Project Management lead to incomplete solutions.</a:t>
+            </a:r>
+          </a:p>
+          <a:p>
+            <a:r>
+              <a:rPr lang="en-CA" dirty="0"/>
+              <a:t>- Poor Group Governance lead to no cohesion in code between group members</a:t>
+            </a:r>
+          </a:p>
+          <a:p>
+            <a:r>
+              <a:rPr lang="en-CA" dirty="0"/>
+              <a:t>- Imperative solution output not formatted and only tackles subproblem</a:t>
+            </a:r>
+          </a:p>
+          <a:p>
+            <a:r>
+              <a:rPr lang="en-CA" dirty="0"/>
+              <a:t>- Functional solution is not complete.</a:t>
+            </a:r>
+          </a:p>
+          <a:p>
+            <a:r>
+              <a:rPr lang="en-CA" dirty="0"/>
+              <a:t>- Lack of robust testing.</a:t>
+            </a:r>
+          </a:p>
+        </p:txBody>
+      </p:sp>
+    </p:spTree>
+    <p:extLst>
+      <p:ext uri="{BB962C8B-B14F-4D97-AF65-F5344CB8AC3E}">
+        <p14:creationId xmlns:p14="http://schemas.microsoft.com/office/powerpoint/2010/main" val="4022338957"/>
+      </p:ext>
+    </p:extLst>
+  </p:cSld>
+  <p:clrMapOvr>
+    <a:masterClrMapping/>
+  </p:clrMapOvr>
+</p:sld>
+</file>
+
+<file path=ppt/slides/slide11.xml><?xml version="1.0" encoding="utf-8"?>
+<p:sld xmlns:a="http://schemas.openxmlformats.org/drawingml/2006/main" xmlns:r="http://schemas.openxmlformats.org/officeDocument/2006/relationships" xmlns:p="http://schemas.openxmlformats.org/presentationml/2006/main">
+  <p:cSld>
+    <p:spTree>
+      <p:nvGrpSpPr>
+        <p:cNvPr id="1" name=""/>
+        <p:cNvGrpSpPr/>
+        <p:nvPr/>
+      </p:nvGrpSpPr>
+      <p:grpSpPr>
+        <a:xfrm>
+          <a:off x="0" y="0"/>
+          <a:ext cx="0" cy="0"/>
+          <a:chOff x="0" y="0"/>
+          <a:chExt cx="0" cy="0"/>
+        </a:xfrm>
+      </p:grpSpPr>
+      <p:sp>
+        <p:nvSpPr>
+          <p:cNvPr id="2" name="Title 1">
+            <a:extLst>
+              <a:ext uri="{FF2B5EF4-FFF2-40B4-BE49-F238E27FC236}">
+                <a16:creationId xmlns:a16="http://schemas.microsoft.com/office/drawing/2014/main" id="{51002C3F-62F2-B79F-395A-EC9EE6DF4B39}"/>
+              </a:ext>
+            </a:extLst>
+          </p:cNvPr>
+          <p:cNvSpPr>
+            <a:spLocks noGrp="1"/>
+          </p:cNvSpPr>
+          <p:nvPr>
+            <p:ph type="title"/>
+          </p:nvPr>
+        </p:nvSpPr>
+        <p:spPr/>
+        <p:txBody>
+          <a:bodyPr/>
+          <a:lstStyle/>
+          <a:p>
+            <a:r>
+              <a:rPr lang="en-CA" dirty="0"/>
+              <a:t>Design and Approach</a:t>
+            </a:r>
+          </a:p>
+        </p:txBody>
+      </p:sp>
+      <p:sp>
+        <p:nvSpPr>
+          <p:cNvPr id="3" name="Content Placeholder 2">
+            <a:extLst>
+              <a:ext uri="{FF2B5EF4-FFF2-40B4-BE49-F238E27FC236}">
+                <a16:creationId xmlns:a16="http://schemas.microsoft.com/office/drawing/2014/main" id="{44B37C74-1DC0-2378-8E20-8C58D5E086EE}"/>
+              </a:ext>
+            </a:extLst>
+          </p:cNvPr>
+          <p:cNvSpPr>
+            <a:spLocks noGrp="1"/>
+          </p:cNvSpPr>
+          <p:nvPr>
+            <p:ph idx="1"/>
+          </p:nvPr>
+        </p:nvSpPr>
+        <p:spPr/>
+        <p:txBody>
+          <a:bodyPr/>
+          <a:lstStyle/>
+          <a:p>
+            <a:r>
+              <a:rPr lang="en-CA" dirty="0"/>
+              <a:t>- Break down my problem into smaller sub problems. </a:t>
+            </a:r>
+          </a:p>
+          <a:p>
+            <a:r>
+              <a:rPr lang="en-CA" dirty="0"/>
+              <a:t>- Test as I go</a:t>
+            </a:r>
+          </a:p>
+          <a:p>
+            <a:r>
+              <a:rPr lang="en-CA" dirty="0"/>
+              <a:t>- Lots of thought went into Data representation.</a:t>
+            </a:r>
+          </a:p>
+          <a:p>
+            <a:r>
+              <a:rPr lang="en-CA" dirty="0"/>
+              <a:t>- Consider limitations of the language for development.</a:t>
+            </a:r>
+          </a:p>
+        </p:txBody>
+      </p:sp>
+    </p:spTree>
+    <p:extLst>
+      <p:ext uri="{BB962C8B-B14F-4D97-AF65-F5344CB8AC3E}">
+        <p14:creationId xmlns:p14="http://schemas.microsoft.com/office/powerpoint/2010/main" val="3928153370"/>
+      </p:ext>
+    </p:extLst>
+  </p:cSld>
+  <p:clrMapOvr>
+    <a:masterClrMapping/>
+  </p:clrMapOvr>
+</p:sld>
+</file>
+
+<file path=ppt/slides/slide12.xml><?xml version="1.0" encoding="utf-8"?>
+<p:sld xmlns:a="http://schemas.openxmlformats.org/drawingml/2006/main" xmlns:r="http://schemas.openxmlformats.org/officeDocument/2006/relationships" xmlns:p="http://schemas.openxmlformats.org/presentationml/2006/main">
+  <p:cSld>
+    <p:spTree>
+      <p:nvGrpSpPr>
+        <p:cNvPr id="1" name=""/>
+        <p:cNvGrpSpPr/>
+        <p:nvPr/>
+      </p:nvGrpSpPr>
+      <p:grpSpPr>
+        <a:xfrm>
+          <a:off x="0" y="0"/>
+          <a:ext cx="0" cy="0"/>
+          <a:chOff x="0" y="0"/>
+          <a:chExt cx="0" cy="0"/>
+        </a:xfrm>
+      </p:grpSpPr>
+      <p:sp>
+        <p:nvSpPr>
+          <p:cNvPr id="2" name="Title 1">
+            <a:extLst>
+              <a:ext uri="{FF2B5EF4-FFF2-40B4-BE49-F238E27FC236}">
                 <a16:creationId xmlns:a16="http://schemas.microsoft.com/office/drawing/2014/main" id="{EB0FE01A-3DDE-DC90-8C57-F51661AA8826}"/>
               </a:ext>
             </a:extLst>
@@ -3974,7 +4196,7 @@
 </p:sld>
 </file>
 
-<file path=ppt/slides/slide11.xml><?xml version="1.0" encoding="utf-8"?>
+<file path=ppt/slides/slide13.xml><?xml version="1.0" encoding="utf-8"?>
 <p:sld xmlns:a="http://schemas.openxmlformats.org/drawingml/2006/main" xmlns:r="http://schemas.openxmlformats.org/officeDocument/2006/relationships" xmlns:p="http://schemas.openxmlformats.org/presentationml/2006/main">
   <p:cSld>
     <p:spTree>
@@ -4254,7 +4476,15 @@
             </a:pPr>
             <a:r>
               <a:rPr lang="en-CA" dirty="0"/>
-              <a:t>Our shell can run ls all day long</a:t>
+              <a:t>Our shell can run 	`</a:t>
+            </a:r>
+            <a:r>
+              <a:rPr lang="en-CA" dirty="0" err="1"/>
+              <a:t>ls`</a:t>
+            </a:r>
+            <a:r>
+              <a:rPr lang="en-CA" dirty="0"/>
+              <a:t> all day long BABY</a:t>
             </a:r>
           </a:p>
         </p:txBody>
@@ -4273,6 +4503,98 @@
 </file>
 
 <file path=ppt/slides/slide4.xml><?xml version="1.0" encoding="utf-8"?>
+<p:sld xmlns:a="http://schemas.openxmlformats.org/drawingml/2006/main" xmlns:r="http://schemas.openxmlformats.org/officeDocument/2006/relationships" xmlns:p="http://schemas.openxmlformats.org/presentationml/2006/main">
+  <p:cSld>
+    <p:spTree>
+      <p:nvGrpSpPr>
+        <p:cNvPr id="1" name="">
+          <a:extLst>
+            <a:ext uri="{FF2B5EF4-FFF2-40B4-BE49-F238E27FC236}">
+              <a16:creationId xmlns:a16="http://schemas.microsoft.com/office/drawing/2014/main" id="{6A9BDED8-41CB-772D-A65E-E83C5BBBCAA8}"/>
+            </a:ext>
+          </a:extLst>
+        </p:cNvPr>
+        <p:cNvGrpSpPr/>
+        <p:nvPr/>
+      </p:nvGrpSpPr>
+      <p:grpSpPr>
+        <a:xfrm>
+          <a:off x="0" y="0"/>
+          <a:ext cx="0" cy="0"/>
+          <a:chOff x="0" y="0"/>
+          <a:chExt cx="0" cy="0"/>
+        </a:xfrm>
+      </p:grpSpPr>
+      <p:sp>
+        <p:nvSpPr>
+          <p:cNvPr id="2" name="Title 1">
+            <a:extLst>
+              <a:ext uri="{FF2B5EF4-FFF2-40B4-BE49-F238E27FC236}">
+                <a16:creationId xmlns:a16="http://schemas.microsoft.com/office/drawing/2014/main" id="{2ECE59AB-A9D7-A206-2BC3-D053627E04B2}"/>
+              </a:ext>
+            </a:extLst>
+          </p:cNvPr>
+          <p:cNvSpPr>
+            <a:spLocks noGrp="1"/>
+          </p:cNvSpPr>
+          <p:nvPr>
+            <p:ph type="title"/>
+          </p:nvPr>
+        </p:nvSpPr>
+        <p:spPr/>
+        <p:txBody>
+          <a:bodyPr/>
+          <a:lstStyle/>
+          <a:p>
+            <a:r>
+              <a:rPr lang="en-CA" dirty="0"/>
+              <a:t>Background Jobs</a:t>
+            </a:r>
+          </a:p>
+        </p:txBody>
+      </p:sp>
+      <p:sp>
+        <p:nvSpPr>
+          <p:cNvPr id="3" name="Content Placeholder 2">
+            <a:extLst>
+              <a:ext uri="{FF2B5EF4-FFF2-40B4-BE49-F238E27FC236}">
+                <a16:creationId xmlns:a16="http://schemas.microsoft.com/office/drawing/2014/main" id="{C168CEC8-C767-3B02-1AAC-ABC2B3174045}"/>
+              </a:ext>
+            </a:extLst>
+          </p:cNvPr>
+          <p:cNvSpPr>
+            <a:spLocks noGrp="1"/>
+          </p:cNvSpPr>
+          <p:nvPr>
+            <p:ph idx="1"/>
+          </p:nvPr>
+        </p:nvSpPr>
+        <p:spPr/>
+        <p:txBody>
+          <a:bodyPr/>
+          <a:lstStyle/>
+          <a:p>
+            <a:pPr marL="0" indent="0">
+              <a:buNone/>
+            </a:pPr>
+            <a:endParaRPr lang="en-CA" dirty="0"/>
+          </a:p>
+        </p:txBody>
+      </p:sp>
+    </p:spTree>
+    <p:extLst>
+      <p:ext uri="{BB962C8B-B14F-4D97-AF65-F5344CB8AC3E}">
+        <p14:creationId xmlns:p14="http://schemas.microsoft.com/office/powerpoint/2010/main" val="3271098932"/>
+      </p:ext>
+    </p:extLst>
+  </p:cSld>
+  <p:clrMapOvr>
+    <a:masterClrMapping/>
+  </p:clrMapOvr>
+</p:sld>
+</file>
+
+<file path=ppt/slides/slide5.xml><?xml version="1.0" encoding="utf-8"?>
 <p:sld xmlns:a="http://schemas.openxmlformats.org/drawingml/2006/main" xmlns:r="http://schemas.openxmlformats.org/officeDocument/2006/relationships" xmlns:p="http://schemas.openxmlformats.org/presentationml/2006/main">
   <p:cSld>
     <p:spTree>
@@ -4364,7 +4686,7 @@
 </p:sld>
 </file>
 
-<file path=ppt/slides/slide5.xml><?xml version="1.0" encoding="utf-8"?>
+<file path=ppt/slides/slide6.xml><?xml version="1.0" encoding="utf-8"?>
 <p:sld xmlns:a="http://schemas.openxmlformats.org/drawingml/2006/main" xmlns:r="http://schemas.openxmlformats.org/officeDocument/2006/relationships" xmlns:p="http://schemas.openxmlformats.org/presentationml/2006/main">
   <p:cSld>
     <p:spTree>
@@ -4456,7 +4778,7 @@
 </p:sld>
 </file>
 
-<file path=ppt/slides/slide6.xml><?xml version="1.0" encoding="utf-8"?>
+<file path=ppt/slides/slide7.xml><?xml version="1.0" encoding="utf-8"?>
 <p:sld xmlns:a="http://schemas.openxmlformats.org/drawingml/2006/main" xmlns:r="http://schemas.openxmlformats.org/officeDocument/2006/relationships" xmlns:p="http://schemas.openxmlformats.org/presentationml/2006/main">
   <p:cSld>
     <p:spTree>
@@ -4464,7 +4786,7 @@
         <p:cNvPr id="1" name="">
           <a:extLst>
             <a:ext uri="{FF2B5EF4-FFF2-40B4-BE49-F238E27FC236}">
-              <a16:creationId xmlns:a16="http://schemas.microsoft.com/office/drawing/2014/main" id="{6A9BDED8-41CB-772D-A65E-E83C5BBBCAA8}"/>
+              <a16:creationId xmlns:a16="http://schemas.microsoft.com/office/drawing/2014/main" id="{9B8B6339-2BE8-D8F4-B4FE-CC437359227B}"/>
             </a:ext>
           </a:extLst>
         </p:cNvPr>
@@ -4484,7 +4806,7 @@
           <p:cNvPr id="2" name="Title 1">
             <a:extLst>
               <a:ext uri="{FF2B5EF4-FFF2-40B4-BE49-F238E27FC236}">
-                <a16:creationId xmlns:a16="http://schemas.microsoft.com/office/drawing/2014/main" id="{2ECE59AB-A9D7-A206-2BC3-D053627E04B2}"/>
+                <a16:creationId xmlns:a16="http://schemas.microsoft.com/office/drawing/2014/main" id="{87DD3C4A-1057-DC56-4C77-9458F75F884B}"/>
               </a:ext>
             </a:extLst>
           </p:cNvPr>
@@ -4502,7 +4824,7 @@
           <a:p>
             <a:r>
               <a:rPr lang="en-CA" dirty="0"/>
-              <a:t>Background Jobs</a:t>
+              <a:t>Search Paths</a:t>
             </a:r>
           </a:p>
         </p:txBody>
@@ -4512,7 +4834,7 @@
           <p:cNvPr id="3" name="Content Placeholder 2">
             <a:extLst>
               <a:ext uri="{FF2B5EF4-FFF2-40B4-BE49-F238E27FC236}">
-                <a16:creationId xmlns:a16="http://schemas.microsoft.com/office/drawing/2014/main" id="{C168CEC8-C767-3B02-1AAC-ABC2B3174045}"/>
+                <a16:creationId xmlns:a16="http://schemas.microsoft.com/office/drawing/2014/main" id="{7BBB8D34-89E9-DF3F-A4DA-AFDC97171BA8}"/>
               </a:ext>
             </a:extLst>
           </p:cNvPr>
@@ -4538,159 +4860,7 @@
     </p:spTree>
     <p:extLst>
       <p:ext uri="{BB962C8B-B14F-4D97-AF65-F5344CB8AC3E}">
-        <p14:creationId xmlns:p14="http://schemas.microsoft.com/office/powerpoint/2010/main" val="3271098932"/>
-      </p:ext>
-    </p:extLst>
-  </p:cSld>
-  <p:clrMapOvr>
-    <a:masterClrMapping/>
-  </p:clrMapOvr>
-</p:sld>
-</file>
-
-<file path=ppt/slides/slide7.xml><?xml version="1.0" encoding="utf-8"?>
-<p:sld xmlns:a="http://schemas.openxmlformats.org/drawingml/2006/main" xmlns:r="http://schemas.openxmlformats.org/officeDocument/2006/relationships" xmlns:p="http://schemas.openxmlformats.org/presentationml/2006/main">
-  <p:cSld>
-    <p:spTree>
-      <p:nvGrpSpPr>
-        <p:cNvPr id="1" name=""/>
-        <p:cNvGrpSpPr/>
-        <p:nvPr/>
-      </p:nvGrpSpPr>
-      <p:grpSpPr>
-        <a:xfrm>
-          <a:off x="0" y="0"/>
-          <a:ext cx="0" cy="0"/>
-          <a:chOff x="0" y="0"/>
-          <a:chExt cx="0" cy="0"/>
-        </a:xfrm>
-      </p:grpSpPr>
-      <p:sp>
-        <p:nvSpPr>
-          <p:cNvPr id="2" name="Title 1">
-            <a:extLst>
-              <a:ext uri="{FF2B5EF4-FFF2-40B4-BE49-F238E27FC236}">
-                <a16:creationId xmlns:a16="http://schemas.microsoft.com/office/drawing/2014/main" id="{52B37D9F-9091-CBEE-10EA-30E279476C57}"/>
-              </a:ext>
-            </a:extLst>
-          </p:cNvPr>
-          <p:cNvSpPr>
-            <a:spLocks noGrp="1"/>
-          </p:cNvSpPr>
-          <p:nvPr>
-            <p:ph type="title"/>
-          </p:nvPr>
-        </p:nvSpPr>
-        <p:spPr/>
-        <p:txBody>
-          <a:bodyPr/>
-          <a:lstStyle/>
-          <a:p>
-            <a:r>
-              <a:rPr lang="en-CA" dirty="0"/>
-              <a:t>Project Breakdown</a:t>
-            </a:r>
-          </a:p>
-        </p:txBody>
-      </p:sp>
-      <p:sp>
-        <p:nvSpPr>
-          <p:cNvPr id="3" name="Content Placeholder 2">
-            <a:extLst>
-              <a:ext uri="{FF2B5EF4-FFF2-40B4-BE49-F238E27FC236}">
-                <a16:creationId xmlns:a16="http://schemas.microsoft.com/office/drawing/2014/main" id="{0ADED527-DAF1-3CA0-245E-0F6A6BAD9242}"/>
-              </a:ext>
-            </a:extLst>
-          </p:cNvPr>
-          <p:cNvSpPr>
-            <a:spLocks noGrp="1"/>
-          </p:cNvSpPr>
-          <p:nvPr>
-            <p:ph idx="1"/>
-          </p:nvPr>
-        </p:nvSpPr>
-        <p:spPr/>
-        <p:txBody>
-          <a:bodyPr/>
-          <a:lstStyle/>
-          <a:p>
-            <a:pPr marL="0" indent="0">
-              <a:buNone/>
-            </a:pPr>
-            <a:r>
-              <a:rPr lang="en-CA" dirty="0"/>
-              <a:t>  -&gt; Populating the argument vector</a:t>
-            </a:r>
-          </a:p>
-          <a:p>
-            <a:pPr marL="1271400" lvl="7" indent="0">
-              <a:buNone/>
-            </a:pPr>
-            <a:r>
-              <a:rPr lang="en-CA" dirty="0"/>
-              <a:t>-&gt; Partition Nodes </a:t>
-            </a:r>
-          </a:p>
-          <a:p>
-            <a:pPr marL="1471400" lvl="8" indent="0">
-              <a:buNone/>
-            </a:pPr>
-            <a:r>
-              <a:rPr lang="en-CA" dirty="0"/>
-              <a:t>	-&gt; Construct a Tree</a:t>
-            </a:r>
-          </a:p>
-          <a:p>
-            <a:pPr marL="1271400" lvl="7" indent="0">
-              <a:buNone/>
-            </a:pPr>
-            <a:r>
-              <a:rPr lang="en-CA" dirty="0"/>
-              <a:t>-&gt; Route Node</a:t>
-            </a:r>
-          </a:p>
-          <a:p>
-            <a:r>
-              <a:rPr lang="en-CA" dirty="0"/>
-              <a:t>-&gt; Matching/Balancing problem </a:t>
-            </a:r>
-          </a:p>
-          <a:p>
-            <a:pPr marL="1271400" lvl="7" indent="0">
-              <a:buNone/>
-            </a:pPr>
-            <a:r>
-              <a:rPr lang="en-CA" dirty="0"/>
-              <a:t>-&gt; Match Partitions Lengths with Bus Capacities</a:t>
-            </a:r>
-          </a:p>
-          <a:p>
-            <a:pPr marL="1271400" lvl="7" indent="0">
-              <a:buNone/>
-            </a:pPr>
-            <a:r>
-              <a:rPr lang="en-CA" dirty="0"/>
-              <a:t>	-&gt; Rebalance Tree </a:t>
-            </a:r>
-          </a:p>
-          <a:p>
-            <a:pPr marL="1271400" lvl="7" indent="0">
-              <a:buNone/>
-            </a:pPr>
-            <a:endParaRPr lang="en-CA" dirty="0"/>
-          </a:p>
-          <a:p>
-            <a:pPr marL="1271400" lvl="7" indent="0">
-              <a:buNone/>
-            </a:pPr>
-            <a:endParaRPr lang="en-CA" dirty="0"/>
-          </a:p>
-        </p:txBody>
-      </p:sp>
-    </p:spTree>
-    <p:extLst>
-      <p:ext uri="{BB962C8B-B14F-4D97-AF65-F5344CB8AC3E}">
-        <p14:creationId xmlns:p14="http://schemas.microsoft.com/office/powerpoint/2010/main" val="786729417"/>
+        <p14:creationId xmlns:p14="http://schemas.microsoft.com/office/powerpoint/2010/main" val="3623829230"/>
       </p:ext>
     </p:extLst>
   </p:cSld>
@@ -4705,7 +4875,13 @@
   <p:cSld>
     <p:spTree>
       <p:nvGrpSpPr>
-        <p:cNvPr id="1" name=""/>
+        <p:cNvPr id="1" name="">
+          <a:extLst>
+            <a:ext uri="{FF2B5EF4-FFF2-40B4-BE49-F238E27FC236}">
+              <a16:creationId xmlns:a16="http://schemas.microsoft.com/office/drawing/2014/main" id="{004BBEF4-D133-4A01-CCF5-1903323104F1}"/>
+            </a:ext>
+          </a:extLst>
+        </p:cNvPr>
         <p:cNvGrpSpPr/>
         <p:nvPr/>
       </p:nvGrpSpPr>
@@ -4722,7 +4898,7 @@
           <p:cNvPr id="2" name="Title 1">
             <a:extLst>
               <a:ext uri="{FF2B5EF4-FFF2-40B4-BE49-F238E27FC236}">
-                <a16:creationId xmlns:a16="http://schemas.microsoft.com/office/drawing/2014/main" id="{0B6C9D4F-0F6E-EB9A-84DE-012E94343FC7}"/>
+                <a16:creationId xmlns:a16="http://schemas.microsoft.com/office/drawing/2014/main" id="{6864E6ED-12D1-83AC-9DD6-F0A3DB9977B8}"/>
               </a:ext>
             </a:extLst>
           </p:cNvPr>
@@ -4740,8 +4916,13 @@
           <a:p>
             <a:r>
               <a:rPr lang="en-CA" dirty="0"/>
-              <a:t>Limitations </a:t>
-            </a:r>
+              <a:t>Signal </a:t>
+            </a:r>
+            <a:r>
+              <a:rPr lang="en-CA" dirty="0" err="1"/>
+              <a:t>Handeling</a:t>
+            </a:r>
+            <a:endParaRPr lang="en-CA" dirty="0"/>
           </a:p>
         </p:txBody>
       </p:sp>
@@ -4750,7 +4931,7 @@
           <p:cNvPr id="3" name="Content Placeholder 2">
             <a:extLst>
               <a:ext uri="{FF2B5EF4-FFF2-40B4-BE49-F238E27FC236}">
-                <a16:creationId xmlns:a16="http://schemas.microsoft.com/office/drawing/2014/main" id="{347498B9-FD20-DC52-40FA-8DFAC8BF5F6F}"/>
+                <a16:creationId xmlns:a16="http://schemas.microsoft.com/office/drawing/2014/main" id="{ED76437A-49EE-059D-06C8-F5EAAD33C14F}"/>
               </a:ext>
             </a:extLst>
           </p:cNvPr>
@@ -4766,47 +4947,17 @@
           <a:bodyPr/>
           <a:lstStyle/>
           <a:p>
-            <a:r>
-              <a:rPr lang="en-CA" dirty="0"/>
-              <a:t>- Only attempted to solve subproblem</a:t>
-            </a:r>
-          </a:p>
-          <a:p>
-            <a:r>
-              <a:rPr lang="en-CA" dirty="0"/>
-              <a:t>- Poor Project Management lead to incomplete solutions.</a:t>
-            </a:r>
-          </a:p>
-          <a:p>
-            <a:r>
-              <a:rPr lang="en-CA" dirty="0"/>
-              <a:t>- Poor Group Governance lead to no cohesion in code between group members</a:t>
-            </a:r>
-          </a:p>
-          <a:p>
-            <a:r>
-              <a:rPr lang="en-CA" dirty="0"/>
-              <a:t>- Imperative solution output not formatted and only tackles subproblem</a:t>
-            </a:r>
-          </a:p>
-          <a:p>
-            <a:r>
-              <a:rPr lang="en-CA" dirty="0"/>
-              <a:t>- Functional solution is not complete.</a:t>
-            </a:r>
-          </a:p>
-          <a:p>
-            <a:r>
-              <a:rPr lang="en-CA" dirty="0"/>
-              <a:t>- Lack of robust testing.</a:t>
-            </a:r>
+            <a:pPr marL="0" indent="0">
+              <a:buNone/>
+            </a:pPr>
+            <a:endParaRPr lang="en-CA" dirty="0"/>
           </a:p>
         </p:txBody>
       </p:sp>
     </p:spTree>
     <p:extLst>
       <p:ext uri="{BB962C8B-B14F-4D97-AF65-F5344CB8AC3E}">
-        <p14:creationId xmlns:p14="http://schemas.microsoft.com/office/powerpoint/2010/main" val="4022338957"/>
+        <p14:creationId xmlns:p14="http://schemas.microsoft.com/office/powerpoint/2010/main" val="266254034"/>
       </p:ext>
     </p:extLst>
   </p:cSld>
@@ -4838,7 +4989,7 @@
           <p:cNvPr id="2" name="Title 1">
             <a:extLst>
               <a:ext uri="{FF2B5EF4-FFF2-40B4-BE49-F238E27FC236}">
-                <a16:creationId xmlns:a16="http://schemas.microsoft.com/office/drawing/2014/main" id="{51002C3F-62F2-B79F-395A-EC9EE6DF4B39}"/>
+                <a16:creationId xmlns:a16="http://schemas.microsoft.com/office/drawing/2014/main" id="{52B37D9F-9091-CBEE-10EA-30E279476C57}"/>
               </a:ext>
             </a:extLst>
           </p:cNvPr>
@@ -4856,7 +5007,7 @@
           <a:p>
             <a:r>
               <a:rPr lang="en-CA" dirty="0"/>
-              <a:t>Design and Approach</a:t>
+              <a:t>Project Breakdown</a:t>
             </a:r>
           </a:p>
         </p:txBody>
@@ -4866,7 +5017,7 @@
           <p:cNvPr id="3" name="Content Placeholder 2">
             <a:extLst>
               <a:ext uri="{FF2B5EF4-FFF2-40B4-BE49-F238E27FC236}">
-                <a16:creationId xmlns:a16="http://schemas.microsoft.com/office/drawing/2014/main" id="{44B37C74-1DC0-2378-8E20-8C58D5E086EE}"/>
+                <a16:creationId xmlns:a16="http://schemas.microsoft.com/office/drawing/2014/main" id="{0ADED527-DAF1-3CA0-245E-0F6A6BAD9242}"/>
               </a:ext>
             </a:extLst>
           </p:cNvPr>
@@ -4882,35 +5033,83 @@
           <a:bodyPr/>
           <a:lstStyle/>
           <a:p>
+            <a:pPr marL="0" indent="0">
+              <a:buNone/>
+            </a:pPr>
             <a:r>
               <a:rPr lang="en-CA" dirty="0"/>
-              <a:t>- Break down my problem into smaller sub problems. </a:t>
-            </a:r>
-          </a:p>
-          <a:p>
+              <a:t>  -&gt; Populating the argument vector</a:t>
+            </a:r>
+          </a:p>
+          <a:p>
+            <a:pPr marL="1271400" lvl="7" indent="0">
+              <a:buNone/>
+            </a:pPr>
             <a:r>
               <a:rPr lang="en-CA" dirty="0"/>
-              <a:t>- Test as I go</a:t>
-            </a:r>
-          </a:p>
-          <a:p>
+              <a:t>-&gt; Partition Nodes </a:t>
+            </a:r>
+          </a:p>
+          <a:p>
+            <a:pPr marL="1471400" lvl="8" indent="0">
+              <a:buNone/>
+            </a:pPr>
             <a:r>
               <a:rPr lang="en-CA" dirty="0"/>
-              <a:t>- Lots of thought went into Data representation.</a:t>
-            </a:r>
-          </a:p>
-          <a:p>
+              <a:t>	-&gt; Construct a Tree</a:t>
+            </a:r>
+          </a:p>
+          <a:p>
+            <a:pPr marL="1271400" lvl="7" indent="0">
+              <a:buNone/>
+            </a:pPr>
             <a:r>
               <a:rPr lang="en-CA" dirty="0"/>
-              <a:t>- Consider limitations of the language for development.</a:t>
-            </a:r>
+              <a:t>-&gt; Route Node</a:t>
+            </a:r>
+          </a:p>
+          <a:p>
+            <a:r>
+              <a:rPr lang="en-CA" dirty="0"/>
+              <a:t>-&gt; Matching/Balancing problem </a:t>
+            </a:r>
+          </a:p>
+          <a:p>
+            <a:pPr marL="1271400" lvl="7" indent="0">
+              <a:buNone/>
+            </a:pPr>
+            <a:r>
+              <a:rPr lang="en-CA" dirty="0"/>
+              <a:t>-&gt; Match Partitions Lengths with Bus Capacities</a:t>
+            </a:r>
+          </a:p>
+          <a:p>
+            <a:pPr marL="1271400" lvl="7" indent="0">
+              <a:buNone/>
+            </a:pPr>
+            <a:r>
+              <a:rPr lang="en-CA" dirty="0"/>
+              <a:t>	-&gt; Rebalance Tree </a:t>
+            </a:r>
+          </a:p>
+          <a:p>
+            <a:pPr marL="1271400" lvl="7" indent="0">
+              <a:buNone/>
+            </a:pPr>
+            <a:endParaRPr lang="en-CA" dirty="0"/>
+          </a:p>
+          <a:p>
+            <a:pPr marL="1271400" lvl="7" indent="0">
+              <a:buNone/>
+            </a:pPr>
+            <a:endParaRPr lang="en-CA" dirty="0"/>
           </a:p>
         </p:txBody>
       </p:sp>
     </p:spTree>
     <p:extLst>
       <p:ext uri="{BB962C8B-B14F-4D97-AF65-F5344CB8AC3E}">
-        <p14:creationId xmlns:p14="http://schemas.microsoft.com/office/powerpoint/2010/main" val="3928153370"/>
+        <p14:creationId xmlns:p14="http://schemas.microsoft.com/office/powerpoint/2010/main" val="786729417"/>
       </p:ext>
     </p:extLst>
   </p:cSld>

</xml_diff>